<commit_message>
cleaning up some stuff
</commit_message>
<xml_diff>
--- a/angularjs/AngularJS.pptx
+++ b/angularjs/AngularJS.pptx
@@ -6,17 +6,18 @@
   </p:sldMasterIdLst>
   <p:sldIdLst>
     <p:sldId id="256" r:id="rId2"/>
-    <p:sldId id="257" r:id="rId3"/>
-    <p:sldId id="262" r:id="rId4"/>
-    <p:sldId id="261" r:id="rId5"/>
-    <p:sldId id="259" r:id="rId6"/>
-    <p:sldId id="263" r:id="rId7"/>
-    <p:sldId id="268" r:id="rId8"/>
-    <p:sldId id="267" r:id="rId9"/>
-    <p:sldId id="265" r:id="rId10"/>
-    <p:sldId id="266" r:id="rId11"/>
-    <p:sldId id="258" r:id="rId12"/>
-    <p:sldId id="264" r:id="rId13"/>
+    <p:sldId id="269" r:id="rId3"/>
+    <p:sldId id="257" r:id="rId4"/>
+    <p:sldId id="262" r:id="rId5"/>
+    <p:sldId id="261" r:id="rId6"/>
+    <p:sldId id="259" r:id="rId7"/>
+    <p:sldId id="263" r:id="rId8"/>
+    <p:sldId id="268" r:id="rId9"/>
+    <p:sldId id="267" r:id="rId10"/>
+    <p:sldId id="265" r:id="rId11"/>
+    <p:sldId id="266" r:id="rId12"/>
+    <p:sldId id="258" r:id="rId13"/>
+    <p:sldId id="264" r:id="rId14"/>
   </p:sldIdLst>
   <p:sldSz cx="9144000" cy="6858000" type="screen4x3"/>
   <p:notesSz cx="6858000" cy="9144000"/>
@@ -354,7 +355,7 @@
           <a:p>
             <a:fld id="{08B8A534-EA6A-4837-9123-2F13D53816C7}" type="datetimeFigureOut">
               <a:rPr lang="en-US" smtClean="0"/>
-              <a:t>6/14/2013</a:t>
+              <a:t>6/19/2013</a:t>
             </a:fld>
             <a:endParaRPr lang="en-US"/>
           </a:p>
@@ -632,7 +633,7 @@
           <a:p>
             <a:fld id="{08B8A534-EA6A-4837-9123-2F13D53816C7}" type="datetimeFigureOut">
               <a:rPr lang="en-US" smtClean="0"/>
-              <a:t>6/14/2013</a:t>
+              <a:t>6/19/2013</a:t>
             </a:fld>
             <a:endParaRPr lang="en-US"/>
           </a:p>
@@ -855,7 +856,7 @@
           <a:p>
             <a:fld id="{08B8A534-EA6A-4837-9123-2F13D53816C7}" type="datetimeFigureOut">
               <a:rPr lang="en-US" smtClean="0"/>
-              <a:t>6/14/2013</a:t>
+              <a:t>6/19/2013</a:t>
             </a:fld>
             <a:endParaRPr lang="en-US"/>
           </a:p>
@@ -1050,7 +1051,7 @@
           <a:p>
             <a:fld id="{08B8A534-EA6A-4837-9123-2F13D53816C7}" type="datetimeFigureOut">
               <a:rPr lang="en-US" smtClean="0"/>
-              <a:t>6/14/2013</a:t>
+              <a:t>6/19/2013</a:t>
             </a:fld>
             <a:endParaRPr lang="en-US"/>
           </a:p>
@@ -1330,7 +1331,7 @@
           <a:p>
             <a:fld id="{08B8A534-EA6A-4837-9123-2F13D53816C7}" type="datetimeFigureOut">
               <a:rPr lang="en-US" smtClean="0"/>
-              <a:t>6/14/2013</a:t>
+              <a:t>6/19/2013</a:t>
             </a:fld>
             <a:endParaRPr lang="en-US"/>
           </a:p>
@@ -1803,7 +1804,7 @@
           <a:p>
             <a:fld id="{08B8A534-EA6A-4837-9123-2F13D53816C7}" type="datetimeFigureOut">
               <a:rPr lang="en-US" smtClean="0"/>
-              <a:t>6/14/2013</a:t>
+              <a:t>6/19/2013</a:t>
             </a:fld>
             <a:endParaRPr lang="en-US"/>
           </a:p>
@@ -2258,7 +2259,7 @@
           <a:p>
             <a:fld id="{08B8A534-EA6A-4837-9123-2F13D53816C7}" type="datetimeFigureOut">
               <a:rPr lang="en-US" smtClean="0"/>
-              <a:t>6/14/2013</a:t>
+              <a:t>6/19/2013</a:t>
             </a:fld>
             <a:endParaRPr lang="en-US"/>
           </a:p>
@@ -2396,7 +2397,7 @@
           <a:p>
             <a:fld id="{08B8A534-EA6A-4837-9123-2F13D53816C7}" type="datetimeFigureOut">
               <a:rPr lang="en-US" smtClean="0"/>
-              <a:t>6/14/2013</a:t>
+              <a:t>6/19/2013</a:t>
             </a:fld>
             <a:endParaRPr lang="en-US"/>
           </a:p>
@@ -2557,7 +2558,7 @@
           <a:p>
             <a:fld id="{08B8A534-EA6A-4837-9123-2F13D53816C7}" type="datetimeFigureOut">
               <a:rPr lang="en-US" smtClean="0"/>
-              <a:t>6/14/2013</a:t>
+              <a:t>6/19/2013</a:t>
             </a:fld>
             <a:endParaRPr lang="en-US"/>
           </a:p>
@@ -2951,7 +2952,7 @@
           <a:p>
             <a:fld id="{08B8A534-EA6A-4837-9123-2F13D53816C7}" type="datetimeFigureOut">
               <a:rPr lang="en-US" smtClean="0"/>
-              <a:t>6/14/2013</a:t>
+              <a:t>6/19/2013</a:t>
             </a:fld>
             <a:endParaRPr lang="en-US"/>
           </a:p>
@@ -3351,7 +3352,7 @@
           <a:p>
             <a:fld id="{08B8A534-EA6A-4837-9123-2F13D53816C7}" type="datetimeFigureOut">
               <a:rPr lang="en-US" smtClean="0"/>
-              <a:t>6/14/2013</a:t>
+              <a:t>6/19/2013</a:t>
             </a:fld>
             <a:endParaRPr lang="en-US"/>
           </a:p>
@@ -3561,7 +3562,7 @@
           <a:p>
             <a:fld id="{08B8A534-EA6A-4837-9123-2F13D53816C7}" type="datetimeFigureOut">
               <a:rPr lang="en-US" smtClean="0"/>
-              <a:t>6/14/2013</a:t>
+              <a:t>6/19/2013</a:t>
             </a:fld>
             <a:endParaRPr lang="en-US"/>
           </a:p>
@@ -4056,59 +4057,27 @@
           <a:bodyPr/>
           <a:lstStyle/>
           <a:p>
-            <a:r>
-              <a:rPr lang="en-US" dirty="0" smtClean="0"/>
-              <a:t>Could be more mature.  It’s fairly new.</a:t>
-            </a:r>
-          </a:p>
-          <a:p>
-            <a:r>
-              <a:rPr lang="en-US" dirty="0" smtClean="0"/>
-              <a:t>Docs are pretty bad in some areas.  Filled with examples that don’t follow best practice.  Some areas are simply incomplete.  Really, they’re horrible.  (I did read they are in the process of redoing them all, though)</a:t>
-            </a:r>
-          </a:p>
-          <a:p>
-            <a:r>
-              <a:rPr lang="en-US" dirty="0" smtClean="0"/>
-              <a:t>Some things </a:t>
-            </a:r>
-            <a:r>
-              <a:rPr lang="en-US" smtClean="0"/>
-              <a:t>are </a:t>
-            </a:r>
-            <a:r>
-              <a:rPr lang="en-US" smtClean="0"/>
-              <a:t>magic </a:t>
-            </a:r>
-            <a:r>
-              <a:rPr lang="en-US" dirty="0" smtClean="0"/>
-              <a:t>that will be hard to debug if you do them </a:t>
-            </a:r>
-            <a:r>
-              <a:rPr lang="en-US" dirty="0" smtClean="0"/>
-              <a:t>wrong</a:t>
-            </a:r>
-          </a:p>
-          <a:p>
-            <a:r>
-              <a:rPr lang="en-US" dirty="0" smtClean="0"/>
-              <a:t>Performance is subpar compared to other similar platforms (but really, they’re all extremely fast) (source: </a:t>
-            </a:r>
-            <a:r>
-              <a:rPr lang="en-US" dirty="0">
-                <a:hlinkClick r:id="rId2"/>
-              </a:rPr>
-              <a:t>http://</a:t>
-            </a:r>
-            <a:r>
-              <a:rPr lang="en-US" dirty="0" smtClean="0">
-                <a:hlinkClick r:id="rId2"/>
-              </a:rPr>
-              <a:t>stackoverflow.com/questions/9682092/databinding-in-angularjs</a:t>
-            </a:r>
-            <a:r>
-              <a:rPr lang="en-US" dirty="0" smtClean="0"/>
-              <a:t>)</a:t>
+            <a:endParaRPr lang="en-US" dirty="0" smtClean="0"/>
+          </a:p>
+          <a:p>
+            <a:endParaRPr lang="en-US" dirty="0"/>
+          </a:p>
+          <a:p>
+            <a:endParaRPr lang="en-US" dirty="0" smtClean="0"/>
+          </a:p>
+          <a:p>
+            <a:endParaRPr lang="en-US" dirty="0"/>
+          </a:p>
+          <a:p>
+            <a:endParaRPr lang="en-US" dirty="0" smtClean="0"/>
+          </a:p>
+          <a:p>
+            <a:endParaRPr lang="en-US" dirty="0"/>
+          </a:p>
+          <a:p>
+            <a:r>
+              <a:rPr lang="en-US" dirty="0" smtClean="0"/>
+              <a:t>I told you, it’s super heroic.</a:t>
             </a:r>
           </a:p>
         </p:txBody>
@@ -4130,7 +4099,15 @@
           <a:p>
             <a:r>
               <a:rPr lang="en-US" dirty="0" smtClean="0"/>
-              <a:t>No, really.  Here’s the list.</a:t>
+              <a:t>What sucks about </a:t>
+            </a:r>
+            <a:r>
+              <a:rPr lang="en-US" dirty="0" err="1" smtClean="0"/>
+              <a:t>AngularJS</a:t>
+            </a:r>
+            <a:r>
+              <a:rPr lang="en-US" dirty="0" smtClean="0"/>
+              <a:t>?</a:t>
             </a:r>
             <a:endParaRPr lang="en-US" dirty="0"/>
           </a:p>
@@ -4139,13 +4116,20 @@
     </p:spTree>
     <p:extLst>
       <p:ext uri="{BB962C8B-B14F-4D97-AF65-F5344CB8AC3E}">
-        <p14:creationId xmlns:p14="http://schemas.microsoft.com/office/powerpoint/2010/main" val="3579367799"/>
+        <p14:creationId xmlns:p14="http://schemas.microsoft.com/office/powerpoint/2010/main" val="3567775276"/>
       </p:ext>
     </p:extLst>
   </p:cSld>
   <p:clrMapOvr>
     <a:masterClrMapping/>
   </p:clrMapOvr>
+  <p:timing>
+    <p:tnLst>
+      <p:par>
+        <p:cTn id="1" dur="indefinite" restart="never" nodeType="tmRoot"/>
+      </p:par>
+    </p:tnLst>
+  </p:timing>
 </p:sld>
 </file>
 
@@ -4178,138 +4162,53 @@
         </p:nvSpPr>
         <p:spPr/>
         <p:txBody>
-          <a:bodyPr>
-            <a:normAutofit/>
-          </a:bodyPr>
-          <a:lstStyle/>
-          <a:p>
-            <a:r>
-              <a:rPr lang="en-US" dirty="0" smtClean="0"/>
-              <a:t>Official site: </a:t>
+          <a:bodyPr/>
+          <a:lstStyle/>
+          <a:p>
+            <a:r>
+              <a:rPr lang="en-US" dirty="0" smtClean="0"/>
+              <a:t>Could be more mature.  It’s fairly new.</a:t>
+            </a:r>
+          </a:p>
+          <a:p>
+            <a:r>
+              <a:rPr lang="en-US" dirty="0" smtClean="0"/>
+              <a:t>Docs are pretty bad in some areas.  Filled with examples that don’t follow best practice.  Some areas are simply incomplete.  Really, they’re horrible.  (I did read they are in the process of redoing them all, though)</a:t>
+            </a:r>
+          </a:p>
+          <a:p>
+            <a:r>
+              <a:rPr lang="en-US" dirty="0" smtClean="0"/>
+              <a:t>Some things are magic that will be hard to debug if you do them wrong</a:t>
+            </a:r>
+          </a:p>
+          <a:p>
+            <a:r>
+              <a:rPr lang="en-US" dirty="0" smtClean="0"/>
+              <a:t>Standard way of doing things is hard to find</a:t>
+            </a:r>
+          </a:p>
+          <a:p>
+            <a:r>
+              <a:rPr lang="en-US" dirty="0" smtClean="0"/>
+              <a:t>Performance is subpar compared to other similar platforms (but really, they’re all extremely fast) (source: </a:t>
+            </a:r>
+            <a:r>
+              <a:rPr lang="en-US" dirty="0">
+                <a:hlinkClick r:id="rId2"/>
+              </a:rPr>
+              <a:t>http://</a:t>
             </a:r>
             <a:r>
               <a:rPr lang="en-US" dirty="0" smtClean="0">
                 <a:hlinkClick r:id="rId2"/>
               </a:rPr>
-              <a:t>http://angularjs.org/</a:t>
-            </a:r>
-            <a:endParaRPr lang="en-US" dirty="0" smtClean="0"/>
-          </a:p>
-          <a:p>
-            <a:r>
-              <a:rPr lang="en-US" dirty="0" smtClean="0"/>
-              <a:t>Official blog: </a:t>
-            </a:r>
-            <a:r>
-              <a:rPr lang="en-US" dirty="0" smtClean="0">
-                <a:hlinkClick r:id="rId3"/>
-              </a:rPr>
-              <a:t>http://blog.angularjs.org/</a:t>
-            </a:r>
-            <a:endParaRPr lang="en-US" dirty="0" smtClean="0"/>
-          </a:p>
-          <a:p>
-            <a:r>
-              <a:rPr lang="en-US" dirty="0" err="1" smtClean="0"/>
-              <a:t>Github</a:t>
-            </a:r>
-            <a:r>
-              <a:rPr lang="en-US" dirty="0" smtClean="0"/>
-              <a:t> seed: </a:t>
-            </a:r>
-            <a:r>
-              <a:rPr lang="en-US" dirty="0" smtClean="0">
-                <a:hlinkClick r:id="rId4"/>
-              </a:rPr>
-              <a:t>https://github.com/angular/angular-seed</a:t>
-            </a:r>
-            <a:endParaRPr lang="en-US" dirty="0" smtClean="0"/>
-          </a:p>
-          <a:p>
-            <a:r>
-              <a:rPr lang="en-US" dirty="0" err="1" smtClean="0"/>
-              <a:t>Batarang</a:t>
-            </a:r>
-            <a:r>
-              <a:rPr lang="en-US" dirty="0" smtClean="0"/>
-              <a:t>: </a:t>
-            </a:r>
-            <a:r>
-              <a:rPr lang="en-US" dirty="0" smtClean="0">
-                <a:hlinkClick r:id="rId5"/>
-              </a:rPr>
-              <a:t>https://chrome.google.com/webstore/detail/angularjs-batarang/ighdmehidhipcmcojjgiloacoafjmpfk?hl=en</a:t>
-            </a:r>
-            <a:endParaRPr lang="en-US" dirty="0" smtClean="0"/>
-          </a:p>
-          <a:p>
-            <a:r>
-              <a:rPr lang="en-US" dirty="0" smtClean="0"/>
-              <a:t>Scope: </a:t>
-            </a:r>
-            <a:r>
-              <a:rPr lang="en-US" dirty="0" smtClean="0">
-                <a:hlinkClick r:id="rId6"/>
-              </a:rPr>
-              <a:t>http://thenittygritty.co/angularjs-pitfalls-using-scopes</a:t>
-            </a:r>
-            <a:endParaRPr lang="en-US" dirty="0" smtClean="0"/>
-          </a:p>
-          <a:p>
-            <a:r>
-              <a:rPr lang="en-US" dirty="0" smtClean="0"/>
-              <a:t>Cheat sheet: </a:t>
-            </a:r>
-            <a:r>
-              <a:rPr lang="en-US" dirty="0" smtClean="0">
-                <a:hlinkClick r:id="rId7"/>
-              </a:rPr>
-              <a:t>http://www.cheatography.com/proloser/cheat-sheets/angularjs/</a:t>
-            </a:r>
-            <a:endParaRPr lang="en-US" dirty="0" smtClean="0"/>
-          </a:p>
-          <a:p>
-            <a:r>
-              <a:rPr lang="en-US" dirty="0" err="1" smtClean="0"/>
-              <a:t>Dev</a:t>
-            </a:r>
-            <a:r>
-              <a:rPr lang="en-US" dirty="0" smtClean="0"/>
-              <a:t> approach: </a:t>
-            </a:r>
-            <a:r>
-              <a:rPr lang="en-US" dirty="0" smtClean="0">
-                <a:hlinkClick r:id="rId8"/>
-              </a:rPr>
-              <a:t>http://stackoverflow.com/questions/14994391/how-do-i-think-in-angularjs-if-i-have-a-jquery-background</a:t>
-            </a:r>
-            <a:endParaRPr lang="en-US" dirty="0" smtClean="0"/>
-          </a:p>
-          <a:p>
-            <a:r>
-              <a:rPr lang="en-US" dirty="0" smtClean="0"/>
-              <a:t>Screencasts: </a:t>
-            </a:r>
-            <a:r>
-              <a:rPr lang="en-US" dirty="0" smtClean="0">
-                <a:hlinkClick r:id="rId9"/>
-              </a:rPr>
-              <a:t>http://www.egghead.io/</a:t>
-            </a:r>
-            <a:endParaRPr lang="en-US" dirty="0" smtClean="0"/>
-          </a:p>
-          <a:p>
-            <a:r>
-              <a:rPr lang="en-US" dirty="0" smtClean="0"/>
-              <a:t>Scrum App: </a:t>
-            </a:r>
-            <a:r>
-              <a:rPr lang="en-US" dirty="0">
-                <a:hlinkClick r:id="rId10"/>
-              </a:rPr>
-              <a:t>https://github.com/kevinkemp/Angular-Scrum</a:t>
-            </a:r>
-            <a:endParaRPr lang="en-US" dirty="0" smtClean="0"/>
+              <a:t>stackoverflow.com/questions/9682092/databinding-in-angularjs</a:t>
+            </a:r>
+            <a:r>
+              <a:rPr lang="en-US" dirty="0" smtClean="0"/>
+              <a:t>)</a:t>
+            </a:r>
           </a:p>
         </p:txBody>
       </p:sp>
@@ -4330,7 +4229,7 @@
           <a:p>
             <a:r>
               <a:rPr lang="en-US" dirty="0" smtClean="0"/>
-              <a:t>Where can I learn more?</a:t>
+              <a:t>No, really.  Here’s the list.</a:t>
             </a:r>
             <a:endParaRPr lang="en-US" dirty="0"/>
           </a:p>
@@ -4339,13 +4238,20 @@
     </p:spTree>
     <p:extLst>
       <p:ext uri="{BB962C8B-B14F-4D97-AF65-F5344CB8AC3E}">
-        <p14:creationId xmlns:p14="http://schemas.microsoft.com/office/powerpoint/2010/main" val="1698817871"/>
+        <p14:creationId xmlns:p14="http://schemas.microsoft.com/office/powerpoint/2010/main" val="3579367799"/>
       </p:ext>
     </p:extLst>
   </p:cSld>
   <p:clrMapOvr>
     <a:masterClrMapping/>
   </p:clrMapOvr>
+  <p:timing>
+    <p:tnLst>
+      <p:par>
+        <p:cTn id="1" dur="indefinite" restart="never" nodeType="tmRoot"/>
+      </p:par>
+    </p:tnLst>
+  </p:timing>
 </p:sld>
 </file>
 
@@ -4378,18 +4284,269 @@
         </p:nvSpPr>
         <p:spPr/>
         <p:txBody>
-          <a:bodyPr/>
-          <a:lstStyle/>
-          <a:p>
-            <a:r>
-              <a:rPr lang="en-US" dirty="0" smtClean="0"/>
-              <a:t>No.</a:t>
-            </a:r>
-          </a:p>
-          <a:p>
-            <a:r>
-              <a:rPr lang="en-US" dirty="0" smtClean="0"/>
-              <a:t>Just kidding.  Here it is, on my </a:t>
+          <a:bodyPr>
+            <a:normAutofit fontScale="92500" lnSpcReduction="20000"/>
+          </a:bodyPr>
+          <a:lstStyle/>
+          <a:p>
+            <a:r>
+              <a:rPr lang="en-US" dirty="0" smtClean="0"/>
+              <a:t>Official site: </a:t>
+            </a:r>
+            <a:r>
+              <a:rPr lang="en-US" dirty="0" smtClean="0">
+                <a:hlinkClick r:id="rId2"/>
+              </a:rPr>
+              <a:t>http://angularjs.org/</a:t>
+            </a:r>
+            <a:endParaRPr lang="en-US" dirty="0" smtClean="0"/>
+          </a:p>
+          <a:p>
+            <a:r>
+              <a:rPr lang="en-US" dirty="0" smtClean="0"/>
+              <a:t>Official blog: </a:t>
+            </a:r>
+            <a:r>
+              <a:rPr lang="en-US" dirty="0" smtClean="0">
+                <a:hlinkClick r:id="rId3"/>
+              </a:rPr>
+              <a:t>http://blog.angularjs.org/</a:t>
+            </a:r>
+            <a:endParaRPr lang="en-US" dirty="0" smtClean="0"/>
+          </a:p>
+          <a:p>
+            <a:r>
+              <a:rPr lang="en-US" dirty="0" err="1" smtClean="0"/>
+              <a:t>Github</a:t>
+            </a:r>
+            <a:r>
+              <a:rPr lang="en-US" dirty="0" smtClean="0"/>
+              <a:t> seed: </a:t>
+            </a:r>
+            <a:r>
+              <a:rPr lang="en-US" dirty="0" smtClean="0">
+                <a:hlinkClick r:id="rId4"/>
+              </a:rPr>
+              <a:t>https://github.com/angular/angular-seed</a:t>
+            </a:r>
+            <a:endParaRPr lang="en-US" dirty="0" smtClean="0"/>
+          </a:p>
+          <a:p>
+            <a:r>
+              <a:rPr lang="en-US" dirty="0" err="1" smtClean="0"/>
+              <a:t>Batarang</a:t>
+            </a:r>
+            <a:r>
+              <a:rPr lang="en-US" dirty="0" smtClean="0"/>
+              <a:t>: </a:t>
+            </a:r>
+            <a:r>
+              <a:rPr lang="en-US" dirty="0" smtClean="0">
+                <a:hlinkClick r:id="rId5"/>
+              </a:rPr>
+              <a:t>https://chrome.google.com/webstore/detail/angularjs-batarang/ighdmehidhipcmcojjgiloacoafjmpfk?hl=en</a:t>
+            </a:r>
+            <a:endParaRPr lang="en-US" dirty="0" smtClean="0"/>
+          </a:p>
+          <a:p>
+            <a:r>
+              <a:rPr lang="en-US" dirty="0" smtClean="0"/>
+              <a:t>Cheat sheet: </a:t>
+            </a:r>
+            <a:r>
+              <a:rPr lang="en-US" dirty="0" smtClean="0">
+                <a:hlinkClick r:id="rId6"/>
+              </a:rPr>
+              <a:t>http://www.cheatography.com/proloser/cheat-sheets/angularjs/</a:t>
+            </a:r>
+            <a:endParaRPr lang="en-US" dirty="0" smtClean="0"/>
+          </a:p>
+          <a:p>
+            <a:r>
+              <a:rPr lang="en-US" dirty="0" err="1" smtClean="0"/>
+              <a:t>Dev</a:t>
+            </a:r>
+            <a:r>
+              <a:rPr lang="en-US" dirty="0" smtClean="0"/>
+              <a:t> approach: </a:t>
+            </a:r>
+            <a:r>
+              <a:rPr lang="en-US" dirty="0" smtClean="0">
+                <a:hlinkClick r:id="rId7"/>
+              </a:rPr>
+              <a:t>http://stackoverflow.com/questions/14994391/how-do-i-think-in-angularjs-if-i-have-a-jquery-background</a:t>
+            </a:r>
+            <a:endParaRPr lang="en-US" dirty="0" smtClean="0"/>
+          </a:p>
+          <a:p>
+            <a:r>
+              <a:rPr lang="en-US" b="1" dirty="0" smtClean="0"/>
+              <a:t>Screencasts</a:t>
+            </a:r>
+            <a:r>
+              <a:rPr lang="en-US" dirty="0" smtClean="0"/>
+              <a:t>: </a:t>
+            </a:r>
+            <a:r>
+              <a:rPr lang="en-US" dirty="0" smtClean="0">
+                <a:hlinkClick r:id="rId8"/>
+              </a:rPr>
+              <a:t>http://www.egghead.io/</a:t>
+            </a:r>
+            <a:endParaRPr lang="en-US" dirty="0" smtClean="0"/>
+          </a:p>
+          <a:p>
+            <a:r>
+              <a:rPr lang="en-US" dirty="0" smtClean="0"/>
+              <a:t>Scrum App: </a:t>
+            </a:r>
+            <a:r>
+              <a:rPr lang="en-US" dirty="0">
+                <a:hlinkClick r:id="rId9"/>
+              </a:rPr>
+              <a:t>https://</a:t>
+            </a:r>
+            <a:r>
+              <a:rPr lang="en-US" dirty="0" smtClean="0">
+                <a:hlinkClick r:id="rId9"/>
+              </a:rPr>
+              <a:t>github.com/kevinkemp/Angular-Scrum</a:t>
+            </a:r>
+            <a:endParaRPr lang="en-US" dirty="0" smtClean="0"/>
+          </a:p>
+          <a:p>
+            <a:r>
+              <a:rPr lang="en-US" dirty="0"/>
+              <a:t>Scope: </a:t>
+            </a:r>
+            <a:r>
+              <a:rPr lang="en-US" dirty="0">
+                <a:hlinkClick r:id="rId10"/>
+              </a:rPr>
+              <a:t>http://thenittygritty.co/angularjs-pitfalls-using-scopes</a:t>
+            </a:r>
+            <a:endParaRPr lang="en-US" dirty="0"/>
+          </a:p>
+          <a:p>
+            <a:r>
+              <a:rPr lang="en-US" dirty="0" smtClean="0"/>
+              <a:t>Dirty Checking: </a:t>
+            </a:r>
+            <a:r>
+              <a:rPr lang="en-US" dirty="0">
+                <a:hlinkClick r:id="rId11"/>
+              </a:rPr>
+              <a:t>http://</a:t>
+            </a:r>
+            <a:r>
+              <a:rPr lang="en-US" dirty="0" smtClean="0">
+                <a:hlinkClick r:id="rId11"/>
+              </a:rPr>
+              <a:t>stackoverflow.com/questions/9682092/databinding-in-angularjs</a:t>
+            </a:r>
+            <a:endParaRPr lang="en-US" dirty="0" smtClean="0"/>
+          </a:p>
+          <a:p>
+            <a:r>
+              <a:rPr lang="en-US" b="1" dirty="0" smtClean="0"/>
+              <a:t>Directives</a:t>
+            </a:r>
+            <a:r>
+              <a:rPr lang="en-US" dirty="0" smtClean="0"/>
+              <a:t>: </a:t>
+            </a:r>
+            <a:r>
+              <a:rPr lang="en-US" dirty="0">
+                <a:hlinkClick r:id="rId12"/>
+              </a:rPr>
+              <a:t>http://amitgharat.wordpress.com/2013/06/08/the-hitchhikers-guide-to-the-directive/</a:t>
+            </a:r>
+            <a:endParaRPr lang="en-US" dirty="0" smtClean="0"/>
+          </a:p>
+        </p:txBody>
+      </p:sp>
+      <p:sp>
+        <p:nvSpPr>
+          <p:cNvPr id="2" name="Title 1"/>
+          <p:cNvSpPr>
+            <a:spLocks noGrp="1"/>
+          </p:cNvSpPr>
+          <p:nvPr>
+            <p:ph type="title"/>
+          </p:nvPr>
+        </p:nvSpPr>
+        <p:spPr/>
+        <p:txBody>
+          <a:bodyPr/>
+          <a:lstStyle/>
+          <a:p>
+            <a:r>
+              <a:rPr lang="en-US" dirty="0" smtClean="0"/>
+              <a:t>Where can I learn more?</a:t>
+            </a:r>
+            <a:endParaRPr lang="en-US" dirty="0"/>
+          </a:p>
+        </p:txBody>
+      </p:sp>
+    </p:spTree>
+    <p:extLst>
+      <p:ext uri="{BB962C8B-B14F-4D97-AF65-F5344CB8AC3E}">
+        <p14:creationId xmlns:p14="http://schemas.microsoft.com/office/powerpoint/2010/main" val="1698817871"/>
+      </p:ext>
+    </p:extLst>
+  </p:cSld>
+  <p:clrMapOvr>
+    <a:masterClrMapping/>
+  </p:clrMapOvr>
+  <p:timing>
+    <p:tnLst>
+      <p:par>
+        <p:cTn id="1" dur="indefinite" restart="never" nodeType="tmRoot"/>
+      </p:par>
+    </p:tnLst>
+  </p:timing>
+</p:sld>
+</file>
+
+<file path=ppt/slides/slide13.xml><?xml version="1.0" encoding="utf-8"?>
+<p:sld xmlns:a="http://schemas.openxmlformats.org/drawingml/2006/main" xmlns:r="http://schemas.openxmlformats.org/officeDocument/2006/relationships" xmlns:p="http://schemas.openxmlformats.org/presentationml/2006/main">
+  <p:cSld>
+    <p:spTree>
+      <p:nvGrpSpPr>
+        <p:cNvPr id="1" name=""/>
+        <p:cNvGrpSpPr/>
+        <p:nvPr/>
+      </p:nvGrpSpPr>
+      <p:grpSpPr>
+        <a:xfrm>
+          <a:off x="0" y="0"/>
+          <a:ext cx="0" cy="0"/>
+          <a:chOff x="0" y="0"/>
+          <a:chExt cx="0" cy="0"/>
+        </a:xfrm>
+      </p:grpSpPr>
+      <p:sp>
+        <p:nvSpPr>
+          <p:cNvPr id="3" name="Content Placeholder 2"/>
+          <p:cNvSpPr>
+            <a:spLocks noGrp="1"/>
+          </p:cNvSpPr>
+          <p:nvPr>
+            <p:ph sz="quarter" idx="13"/>
+          </p:nvPr>
+        </p:nvSpPr>
+        <p:spPr/>
+        <p:txBody>
+          <a:bodyPr/>
+          <a:lstStyle/>
+          <a:p>
+            <a:r>
+              <a:rPr lang="en-US" dirty="0" smtClean="0"/>
+              <a:t>Here </a:t>
+            </a:r>
+            <a:r>
+              <a:rPr lang="en-US" dirty="0" smtClean="0"/>
+              <a:t>it is, on my </a:t>
             </a:r>
             <a:r>
               <a:rPr lang="en-US" dirty="0" err="1" smtClean="0"/>
@@ -4447,6 +4604,13 @@
   <p:clrMapOvr>
     <a:masterClrMapping/>
   </p:clrMapOvr>
+  <p:timing>
+    <p:tnLst>
+      <p:par>
+        <p:cTn id="1" dur="indefinite" restart="never" nodeType="tmRoot"/>
+      </p:par>
+    </p:tnLst>
+  </p:timing>
 </p:sld>
 </file>
 
@@ -4469,7 +4633,7 @@
       </p:grpSpPr>
       <p:sp>
         <p:nvSpPr>
-          <p:cNvPr id="3" name="Content Placeholder 2"/>
+          <p:cNvPr id="2" name="Content Placeholder 1"/>
           <p:cNvSpPr>
             <a:spLocks noGrp="1"/>
           </p:cNvSpPr>
@@ -4482,65 +4646,29 @@
           <a:bodyPr/>
           <a:lstStyle/>
           <a:p>
+            <a:r>
+              <a:rPr lang="en-US" dirty="0" smtClean="0"/>
+              <a:t>Answer these questions:</a:t>
+            </a:r>
+          </a:p>
+          <a:p>
+            <a:r>
+              <a:rPr lang="en-US" dirty="0" smtClean="0"/>
+              <a:t>What is </a:t>
+            </a:r>
             <a:r>
               <a:rPr lang="en-US" dirty="0" err="1" smtClean="0"/>
               <a:t>AngularJS</a:t>
             </a:r>
             <a:r>
               <a:rPr lang="en-US" dirty="0" smtClean="0"/>
-              <a:t> is a super heroic </a:t>
-            </a:r>
-            <a:r>
-              <a:rPr lang="en-US" dirty="0" err="1" smtClean="0"/>
-              <a:t>Javascript</a:t>
-            </a:r>
-            <a:r>
-              <a:rPr lang="en-US" dirty="0" smtClean="0"/>
-              <a:t> MVVM framework written by Google.  No, seriously.</a:t>
-            </a:r>
-            <a:endParaRPr lang="en-US" dirty="0"/>
-          </a:p>
-          <a:p>
-            <a:r>
-              <a:rPr lang="en-US" dirty="0"/>
-              <a:t>Single Page Application (SPA) framework</a:t>
-            </a:r>
-            <a:r>
-              <a:rPr lang="en-US" dirty="0" smtClean="0"/>
-              <a:t>.</a:t>
-            </a:r>
-          </a:p>
-          <a:p>
-            <a:r>
-              <a:rPr lang="en-US" dirty="0" smtClean="0"/>
-              <a:t>Server </a:t>
-            </a:r>
-            <a:r>
-              <a:rPr lang="en-US" dirty="0" smtClean="0"/>
-              <a:t>side interaction only needed to download your “app”.  Typically, there will probably be some interaction with web services, but not necessary depending on the application.</a:t>
-            </a:r>
-            <a:endParaRPr lang="en-US" dirty="0"/>
-          </a:p>
-        </p:txBody>
-      </p:sp>
-      <p:sp>
-        <p:nvSpPr>
-          <p:cNvPr id="2" name="Title 1"/>
-          <p:cNvSpPr>
-            <a:spLocks noGrp="1"/>
-          </p:cNvSpPr>
-          <p:nvPr>
-            <p:ph type="title"/>
-          </p:nvPr>
-        </p:nvSpPr>
-        <p:spPr/>
-        <p:txBody>
-          <a:bodyPr/>
-          <a:lstStyle/>
-          <a:p>
-            <a:r>
-              <a:rPr lang="en-US" dirty="0" smtClean="0"/>
-              <a:t>What is </a:t>
+              <a:t>?</a:t>
+            </a:r>
+          </a:p>
+          <a:p>
+            <a:r>
+              <a:rPr lang="en-US" dirty="0" smtClean="0"/>
+              <a:t>Why should I care about </a:t>
             </a:r>
             <a:r>
               <a:rPr lang="en-US" dirty="0" err="1" smtClean="0"/>
@@ -4549,6 +4677,41 @@
             <a:r>
               <a:rPr lang="en-US" dirty="0" smtClean="0"/>
               <a:t>?</a:t>
+            </a:r>
+          </a:p>
+          <a:p>
+            <a:r>
+              <a:rPr lang="en-US" dirty="0" smtClean="0"/>
+              <a:t>What competitors are out there?</a:t>
+            </a:r>
+          </a:p>
+          <a:p>
+            <a:r>
+              <a:rPr lang="en-US" dirty="0" smtClean="0"/>
+              <a:t>When should I use it?</a:t>
+            </a:r>
+            <a:endParaRPr lang="en-US" dirty="0"/>
+          </a:p>
+        </p:txBody>
+      </p:sp>
+      <p:sp>
+        <p:nvSpPr>
+          <p:cNvPr id="3" name="Title 2"/>
+          <p:cNvSpPr>
+            <a:spLocks noGrp="1"/>
+          </p:cNvSpPr>
+          <p:nvPr>
+            <p:ph type="title"/>
+          </p:nvPr>
+        </p:nvSpPr>
+        <p:spPr/>
+        <p:txBody>
+          <a:bodyPr/>
+          <a:lstStyle/>
+          <a:p>
+            <a:r>
+              <a:rPr lang="en-US" dirty="0" smtClean="0"/>
+              <a:t>Goals</a:t>
             </a:r>
             <a:endParaRPr lang="en-US" dirty="0"/>
           </a:p>
@@ -4557,7 +4720,7 @@
     </p:spTree>
     <p:extLst>
       <p:ext uri="{BB962C8B-B14F-4D97-AF65-F5344CB8AC3E}">
-        <p14:creationId xmlns:p14="http://schemas.microsoft.com/office/powerpoint/2010/main" val="1753174930"/>
+        <p14:creationId xmlns:p14="http://schemas.microsoft.com/office/powerpoint/2010/main" val="2926996553"/>
       </p:ext>
     </p:extLst>
   </p:cSld>
@@ -4600,14 +4763,12 @@
           <a:lstStyle/>
           <a:p>
             <a:r>
-              <a:rPr lang="en-US" dirty="0" smtClean="0"/>
-              <a:t>An application with only a single page, duh.</a:t>
-            </a:r>
-          </a:p>
-          <a:p>
-            <a:r>
-              <a:rPr lang="en-US" dirty="0" smtClean="0"/>
-              <a:t>Runs completely client side (</a:t>
+              <a:rPr lang="en-US" dirty="0" err="1" smtClean="0"/>
+              <a:t>AngularJS</a:t>
+            </a:r>
+            <a:r>
+              <a:rPr lang="en-US" dirty="0" smtClean="0"/>
+              <a:t> is a super heroic </a:t>
             </a:r>
             <a:r>
               <a:rPr lang="en-US" dirty="0" err="1" smtClean="0"/>
@@ -4615,23 +4776,19 @@
             </a:r>
             <a:r>
               <a:rPr lang="en-US" dirty="0" smtClean="0"/>
-              <a:t>)</a:t>
-            </a:r>
-          </a:p>
-          <a:p>
-            <a:r>
-              <a:rPr lang="en-US" dirty="0" smtClean="0"/>
-              <a:t>Canonical example: the TO-DO app</a:t>
-            </a:r>
-          </a:p>
-          <a:p>
-            <a:r>
-              <a:rPr lang="en-US" dirty="0">
-                <a:hlinkClick r:id="rId2"/>
-              </a:rPr>
-              <a:t>http://todomvc.com/architecture-examples/angularjs/</a:t>
-            </a:r>
-            <a:endParaRPr lang="en-US" dirty="0" smtClean="0"/>
+              <a:t> MVVM framework written by Google.  No, seriously.</a:t>
+            </a:r>
+            <a:endParaRPr lang="en-US" dirty="0"/>
+          </a:p>
+          <a:p>
+            <a:r>
+              <a:rPr lang="en-US" dirty="0"/>
+              <a:t>Single Page Application (SPA) framework</a:t>
+            </a:r>
+            <a:r>
+              <a:rPr lang="en-US" dirty="0" smtClean="0"/>
+              <a:t>.</a:t>
+            </a:r>
           </a:p>
         </p:txBody>
       </p:sp>
@@ -4652,7 +4809,15 @@
           <a:p>
             <a:r>
               <a:rPr lang="en-US" dirty="0" smtClean="0"/>
-              <a:t>What is a SPA?</a:t>
+              <a:t>What is </a:t>
+            </a:r>
+            <a:r>
+              <a:rPr lang="en-US" dirty="0" err="1" smtClean="0"/>
+              <a:t>AngularJS</a:t>
+            </a:r>
+            <a:r>
+              <a:rPr lang="en-US" dirty="0" smtClean="0"/>
+              <a:t>?</a:t>
             </a:r>
             <a:endParaRPr lang="en-US" dirty="0"/>
           </a:p>
@@ -4661,7 +4826,7 @@
     </p:spTree>
     <p:extLst>
       <p:ext uri="{BB962C8B-B14F-4D97-AF65-F5344CB8AC3E}">
-        <p14:creationId xmlns:p14="http://schemas.microsoft.com/office/powerpoint/2010/main" val="2028831113"/>
+        <p14:creationId xmlns:p14="http://schemas.microsoft.com/office/powerpoint/2010/main" val="1753174930"/>
       </p:ext>
     </p:extLst>
   </p:cSld>
@@ -4700,44 +4865,48 @@
         </p:nvSpPr>
         <p:spPr/>
         <p:txBody>
-          <a:bodyPr>
-            <a:normAutofit/>
-          </a:bodyPr>
-          <a:lstStyle/>
-          <a:p>
-            <a:r>
-              <a:rPr lang="en-US" dirty="0" smtClean="0"/>
-              <a:t>Web pages that respond like native applications</a:t>
-            </a:r>
-          </a:p>
-          <a:p>
-            <a:r>
-              <a:rPr lang="en-US" dirty="0" smtClean="0"/>
-              <a:t>Client-side routing</a:t>
-            </a:r>
-          </a:p>
-          <a:p>
-            <a:r>
-              <a:rPr lang="en-US" dirty="0" smtClean="0"/>
-              <a:t>Can function better than traditional web pages with intermittent connectivity (mobile)</a:t>
-            </a:r>
-          </a:p>
-          <a:p>
-            <a:r>
-              <a:rPr lang="en-US" dirty="0" smtClean="0"/>
-              <a:t>Clients are getting beefier</a:t>
-            </a:r>
-          </a:p>
-          <a:p>
+          <a:bodyPr/>
+          <a:lstStyle/>
+          <a:p>
+            <a:r>
+              <a:rPr lang="en-US" dirty="0" smtClean="0"/>
+              <a:t>A web application with only a single page, duh.</a:t>
+            </a:r>
+          </a:p>
+          <a:p>
+            <a:r>
+              <a:rPr lang="en-US" dirty="0"/>
+              <a:t>Server side interaction only needed to download your “app”.  Typically, there will probably be some interaction with web services, but not necessary depending on the application.</a:t>
+            </a:r>
+          </a:p>
+          <a:p>
+            <a:r>
+              <a:rPr lang="en-US" dirty="0" smtClean="0"/>
+              <a:t>Runs completely client side (</a:t>
+            </a:r>
             <a:r>
               <a:rPr lang="en-US" dirty="0" err="1" smtClean="0"/>
               <a:t>Javascript</a:t>
             </a:r>
             <a:r>
               <a:rPr lang="en-US" dirty="0" smtClean="0"/>
-              <a:t> provides short feedback loops</a:t>
-            </a:r>
-            <a:endParaRPr lang="en-US" dirty="0"/>
+              <a:t>)</a:t>
+            </a:r>
+          </a:p>
+          <a:p>
+            <a:r>
+              <a:rPr lang="en-US" dirty="0" smtClean="0"/>
+              <a:t>Canonical example: the TO-DO app</a:t>
+            </a:r>
+          </a:p>
+          <a:p>
+            <a:r>
+              <a:rPr lang="en-US" dirty="0">
+                <a:hlinkClick r:id="rId2"/>
+              </a:rPr>
+              <a:t>http://todomvc.com/architecture-examples/angularjs/</a:t>
+            </a:r>
+            <a:endParaRPr lang="en-US" dirty="0" smtClean="0"/>
           </a:p>
         </p:txBody>
       </p:sp>
@@ -4758,7 +4927,7 @@
           <a:p>
             <a:r>
               <a:rPr lang="en-US" dirty="0" smtClean="0"/>
-              <a:t>Why should I care?</a:t>
+              <a:t>What is a SPA?</a:t>
             </a:r>
             <a:endParaRPr lang="en-US" dirty="0"/>
           </a:p>
@@ -4767,7 +4936,7 @@
     </p:spTree>
     <p:extLst>
       <p:ext uri="{BB962C8B-B14F-4D97-AF65-F5344CB8AC3E}">
-        <p14:creationId xmlns:p14="http://schemas.microsoft.com/office/powerpoint/2010/main" val="106916934"/>
+        <p14:creationId xmlns:p14="http://schemas.microsoft.com/office/powerpoint/2010/main" val="2028831113"/>
       </p:ext>
     </p:extLst>
   </p:cSld>
@@ -4806,28 +4975,43 @@
         </p:nvSpPr>
         <p:spPr/>
         <p:txBody>
-          <a:bodyPr/>
-          <a:lstStyle/>
-          <a:p>
-            <a:r>
-              <a:rPr lang="en-US" dirty="0" smtClean="0"/>
-              <a:t>Backbone (very minimalist… not a comparable feature set)</a:t>
+          <a:bodyPr>
+            <a:normAutofit/>
+          </a:bodyPr>
+          <a:lstStyle/>
+          <a:p>
+            <a:r>
+              <a:rPr lang="en-US" dirty="0" smtClean="0"/>
+              <a:t>Web pages that respond like native applications</a:t>
+            </a:r>
+          </a:p>
+          <a:p>
+            <a:r>
+              <a:rPr lang="en-US" dirty="0" smtClean="0"/>
+              <a:t>Client-side routing</a:t>
+            </a:r>
+          </a:p>
+          <a:p>
+            <a:r>
+              <a:rPr lang="en-US" dirty="0" smtClean="0"/>
+              <a:t>Can function better than traditional web pages with intermittent connectivity (mobile)</a:t>
             </a:r>
           </a:p>
           <a:p>
             <a:r>
               <a:rPr lang="en-US" dirty="0" err="1" smtClean="0"/>
-              <a:t>EmberJS</a:t>
+              <a:t>Javascript</a:t>
+            </a:r>
+            <a:r>
+              <a:rPr lang="en-US" dirty="0" smtClean="0"/>
+              <a:t> </a:t>
+            </a:r>
+            <a:r>
+              <a:rPr lang="en-US" dirty="0" smtClean="0"/>
+              <a:t>provides short feedback loops</a:t>
             </a:r>
             <a:endParaRPr lang="en-US" dirty="0"/>
           </a:p>
-          <a:p>
-            <a:r>
-              <a:rPr lang="en-US" dirty="0" smtClean="0"/>
-              <a:t>Lots of others</a:t>
-            </a:r>
-            <a:endParaRPr lang="en-US" dirty="0"/>
-          </a:p>
         </p:txBody>
       </p:sp>
       <p:sp>
@@ -4842,14 +5026,12 @@
         </p:nvSpPr>
         <p:spPr/>
         <p:txBody>
-          <a:bodyPr>
-            <a:normAutofit fontScale="90000"/>
-          </a:bodyPr>
-          <a:lstStyle/>
-          <a:p>
-            <a:r>
-              <a:rPr lang="en-US" dirty="0" smtClean="0"/>
-              <a:t>But what about other SPA frameworks?</a:t>
+          <a:bodyPr/>
+          <a:lstStyle/>
+          <a:p>
+            <a:r>
+              <a:rPr lang="en-US" dirty="0" smtClean="0"/>
+              <a:t>Why should I care?</a:t>
             </a:r>
             <a:endParaRPr lang="en-US" dirty="0"/>
           </a:p>
@@ -4858,7 +5040,7 @@
     </p:spTree>
     <p:extLst>
       <p:ext uri="{BB962C8B-B14F-4D97-AF65-F5344CB8AC3E}">
-        <p14:creationId xmlns:p14="http://schemas.microsoft.com/office/powerpoint/2010/main" val="3256840093"/>
+        <p14:creationId xmlns:p14="http://schemas.microsoft.com/office/powerpoint/2010/main" val="106916934"/>
       </p:ext>
     </p:extLst>
   </p:cSld>
@@ -4897,95 +5079,50 @@
         </p:nvSpPr>
         <p:spPr/>
         <p:txBody>
+          <a:bodyPr/>
+          <a:lstStyle/>
+          <a:p>
+            <a:r>
+              <a:rPr lang="en-US" dirty="0" smtClean="0"/>
+              <a:t>Backbone (very minimalist… not a comparable feature set)</a:t>
+            </a:r>
+          </a:p>
+          <a:p>
+            <a:r>
+              <a:rPr lang="en-US" dirty="0" err="1" smtClean="0"/>
+              <a:t>EmberJS</a:t>
+            </a:r>
+            <a:endParaRPr lang="en-US" dirty="0"/>
+          </a:p>
+          <a:p>
+            <a:r>
+              <a:rPr lang="en-US" dirty="0" smtClean="0"/>
+              <a:t>Lots of others</a:t>
+            </a:r>
+            <a:endParaRPr lang="en-US" dirty="0"/>
+          </a:p>
+        </p:txBody>
+      </p:sp>
+      <p:sp>
+        <p:nvSpPr>
+          <p:cNvPr id="2" name="Title 1"/>
+          <p:cNvSpPr>
+            <a:spLocks noGrp="1"/>
+          </p:cNvSpPr>
+          <p:nvPr>
+            <p:ph type="title"/>
+          </p:nvPr>
+        </p:nvSpPr>
+        <p:spPr/>
+        <p:txBody>
           <a:bodyPr>
-            <a:normAutofit/>
+            <a:normAutofit fontScale="90000"/>
           </a:bodyPr>
           <a:lstStyle/>
           <a:p>
             <a:r>
               <a:rPr lang="en-US" dirty="0" smtClean="0"/>
-              <a:t>Full stack solution</a:t>
-            </a:r>
-          </a:p>
-          <a:p>
-            <a:r>
-              <a:rPr lang="en-US" dirty="0" smtClean="0"/>
-              <a:t>Built to be testable (dependency injection)</a:t>
-            </a:r>
-          </a:p>
-          <a:p>
-            <a:r>
-              <a:rPr lang="en-US" dirty="0" smtClean="0"/>
-              <a:t>2-way </a:t>
-            </a:r>
-            <a:r>
-              <a:rPr lang="en-US" dirty="0" err="1" smtClean="0"/>
-              <a:t>databinding</a:t>
-            </a:r>
-            <a:r>
-              <a:rPr lang="en-US" dirty="0" smtClean="0"/>
-              <a:t> (with plain old </a:t>
-            </a:r>
-            <a:r>
-              <a:rPr lang="en-US" dirty="0" err="1" smtClean="0"/>
-              <a:t>Javascript</a:t>
-            </a:r>
-            <a:r>
-              <a:rPr lang="en-US" dirty="0" smtClean="0"/>
-              <a:t> objects!)</a:t>
-            </a:r>
-          </a:p>
-          <a:p>
-            <a:r>
-              <a:rPr lang="en-US" dirty="0" smtClean="0"/>
-              <a:t>Can be added to projects</a:t>
-            </a:r>
-            <a:endParaRPr lang="en-US" dirty="0" smtClean="0"/>
-          </a:p>
-          <a:p>
-            <a:r>
-              <a:rPr lang="en-US" dirty="0" smtClean="0"/>
-              <a:t>Small </a:t>
-            </a:r>
-            <a:r>
-              <a:rPr lang="en-US" dirty="0" smtClean="0"/>
-              <a:t>footprint (minified ~80kb)</a:t>
-            </a:r>
-          </a:p>
-          <a:p>
-            <a:r>
-              <a:rPr lang="en-US" dirty="0" smtClean="0"/>
-              <a:t>Popular</a:t>
-            </a:r>
-          </a:p>
-        </p:txBody>
-      </p:sp>
-      <p:sp>
-        <p:nvSpPr>
-          <p:cNvPr id="2" name="Title 1"/>
-          <p:cNvSpPr>
-            <a:spLocks noGrp="1"/>
-          </p:cNvSpPr>
-          <p:nvPr>
-            <p:ph type="title"/>
-          </p:nvPr>
-        </p:nvSpPr>
-        <p:spPr/>
-        <p:txBody>
-          <a:bodyPr/>
-          <a:lstStyle/>
-          <a:p>
-            <a:r>
-              <a:rPr lang="en-US" dirty="0" smtClean="0"/>
-              <a:t>Why </a:t>
-            </a:r>
-            <a:r>
-              <a:rPr lang="en-US" dirty="0" err="1" smtClean="0"/>
-              <a:t>AngularJS</a:t>
-            </a:r>
-            <a:r>
-              <a:rPr lang="en-US" dirty="0" smtClean="0"/>
-              <a:t> then?</a:t>
+              <a:t>But what about other SPA frameworks?</a:t>
             </a:r>
             <a:endParaRPr lang="en-US" dirty="0"/>
           </a:p>
@@ -4994,13 +5131,20 @@
     </p:spTree>
     <p:extLst>
       <p:ext uri="{BB962C8B-B14F-4D97-AF65-F5344CB8AC3E}">
-        <p14:creationId xmlns:p14="http://schemas.microsoft.com/office/powerpoint/2010/main" val="1801816137"/>
+        <p14:creationId xmlns:p14="http://schemas.microsoft.com/office/powerpoint/2010/main" val="3256840093"/>
       </p:ext>
     </p:extLst>
   </p:cSld>
   <p:clrMapOvr>
     <a:masterClrMapping/>
   </p:clrMapOvr>
+  <p:timing>
+    <p:tnLst>
+      <p:par>
+        <p:cTn id="1" dur="indefinite" restart="never" nodeType="tmRoot"/>
+      </p:par>
+    </p:tnLst>
+  </p:timing>
 </p:sld>
 </file>
 
@@ -5023,7 +5167,7 @@
       </p:grpSpPr>
       <p:sp>
         <p:nvSpPr>
-          <p:cNvPr id="2" name="Content Placeholder 1"/>
+          <p:cNvPr id="3" name="Content Placeholder 2"/>
           <p:cNvSpPr>
             <a:spLocks noGrp="1"/>
           </p:cNvSpPr>
@@ -5033,126 +5177,112 @@
         </p:nvSpPr>
         <p:spPr/>
         <p:txBody>
-          <a:bodyPr/>
-          <a:lstStyle/>
-          <a:p>
-            <a:r>
-              <a:rPr lang="en-US" dirty="0"/>
-              <a:t>Re-usable components (</a:t>
-            </a:r>
-            <a:r>
-              <a:rPr lang="en-US" dirty="0" smtClean="0"/>
-              <a:t>directives)</a:t>
+          <a:bodyPr>
+            <a:normAutofit/>
+          </a:bodyPr>
+          <a:lstStyle/>
+          <a:p>
+            <a:r>
+              <a:rPr lang="en-US" dirty="0" smtClean="0"/>
+              <a:t>Full stack solution</a:t>
+            </a:r>
+          </a:p>
+          <a:p>
+            <a:r>
+              <a:rPr lang="en-US" dirty="0" smtClean="0"/>
+              <a:t>Built to be testable (dependency injection)</a:t>
+            </a:r>
+          </a:p>
+          <a:p>
+            <a:r>
+              <a:rPr lang="en-US" dirty="0" smtClean="0"/>
+              <a:t>2-way </a:t>
+            </a:r>
+            <a:r>
+              <a:rPr lang="en-US" dirty="0" err="1" smtClean="0"/>
+              <a:t>databinding</a:t>
+            </a:r>
+            <a:r>
+              <a:rPr lang="en-US" dirty="0" smtClean="0"/>
+              <a:t> (with plain old </a:t>
+            </a:r>
+            <a:r>
+              <a:rPr lang="en-US" dirty="0" err="1" smtClean="0"/>
+              <a:t>Javascript</a:t>
+            </a:r>
+            <a:r>
+              <a:rPr lang="en-US" dirty="0" smtClean="0"/>
+              <a:t> objects!)</a:t>
+            </a:r>
+          </a:p>
+          <a:p>
+            <a:r>
+              <a:rPr lang="en-US" dirty="0" smtClean="0"/>
+              <a:t>Can be added to projects</a:t>
+            </a:r>
+          </a:p>
+          <a:p>
+            <a:r>
+              <a:rPr lang="en-US" dirty="0" smtClean="0"/>
+              <a:t>Small footprint (minified ~80kb)</a:t>
+            </a:r>
+          </a:p>
+          <a:p>
+            <a:r>
+              <a:rPr lang="en-US" dirty="0" smtClean="0"/>
+              <a:t>Popular</a:t>
+            </a:r>
+          </a:p>
+        </p:txBody>
+      </p:sp>
+      <p:sp>
+        <p:nvSpPr>
+          <p:cNvPr id="2" name="Title 1"/>
+          <p:cNvSpPr>
+            <a:spLocks noGrp="1"/>
+          </p:cNvSpPr>
+          <p:nvPr>
+            <p:ph type="title"/>
+          </p:nvPr>
+        </p:nvSpPr>
+        <p:spPr/>
+        <p:txBody>
+          <a:bodyPr/>
+          <a:lstStyle/>
+          <a:p>
+            <a:r>
+              <a:rPr lang="en-US" dirty="0" smtClean="0"/>
+              <a:t>Why </a:t>
+            </a:r>
+            <a:r>
+              <a:rPr lang="en-US" dirty="0" err="1" smtClean="0"/>
+              <a:t>AngularJS</a:t>
+            </a:r>
+            <a:r>
+              <a:rPr lang="en-US" dirty="0" smtClean="0"/>
+              <a:t> then?</a:t>
             </a:r>
             <a:endParaRPr lang="en-US" dirty="0"/>
           </a:p>
-          <a:p>
-            <a:r>
-              <a:rPr lang="en-US" dirty="0"/>
-              <a:t>Declarative </a:t>
-            </a:r>
-            <a:r>
-              <a:rPr lang="en-US" dirty="0" smtClean="0"/>
-              <a:t>HTML (with semantic markup!)</a:t>
-            </a:r>
-            <a:endParaRPr lang="en-US" dirty="0"/>
-          </a:p>
-          <a:p>
-            <a:r>
-              <a:rPr lang="en-US" dirty="0"/>
-              <a:t>Templates don’t feature string </a:t>
-            </a:r>
-            <a:r>
-              <a:rPr lang="en-US" dirty="0" smtClean="0"/>
-              <a:t>manipulation</a:t>
-            </a:r>
-            <a:endParaRPr lang="en-US" dirty="0"/>
-          </a:p>
-        </p:txBody>
-      </p:sp>
-      <p:sp>
-        <p:nvSpPr>
-          <p:cNvPr id="3" name="Title 2"/>
-          <p:cNvSpPr>
-            <a:spLocks noGrp="1"/>
-          </p:cNvSpPr>
-          <p:nvPr>
-            <p:ph type="title"/>
-          </p:nvPr>
-        </p:nvSpPr>
-        <p:spPr/>
-        <p:txBody>
-          <a:bodyPr/>
-          <a:lstStyle/>
-          <a:p>
-            <a:endParaRPr lang="en-US"/>
-          </a:p>
-        </p:txBody>
-      </p:sp>
-      <p:pic>
-        <p:nvPicPr>
-          <p:cNvPr id="1026" name="Picture 2"/>
-          <p:cNvPicPr>
-            <a:picLocks noChangeAspect="1" noChangeArrowheads="1"/>
-          </p:cNvPicPr>
-          <p:nvPr/>
-        </p:nvPicPr>
-        <p:blipFill>
-          <a:blip r:embed="rId2">
-            <a:extLst>
-              <a:ext uri="{28A0092B-C50C-407E-A947-70E740481C1C}">
-                <a14:useLocalDpi xmlns:a14="http://schemas.microsoft.com/office/drawing/2010/main" val="0"/>
-              </a:ext>
-            </a:extLst>
-          </a:blip>
-          <a:srcRect/>
-          <a:stretch>
-            <a:fillRect/>
-          </a:stretch>
-        </p:blipFill>
-        <p:spPr bwMode="auto">
-          <a:xfrm>
-            <a:off x="152400" y="2819400"/>
-            <a:ext cx="8686800" cy="3886200"/>
-          </a:xfrm>
-          <a:prstGeom prst="rect">
-            <a:avLst/>
-          </a:prstGeom>
-          <a:noFill/>
-          <a:ln>
-            <a:noFill/>
-          </a:ln>
-          <a:extLst>
-            <a:ext uri="{909E8E84-426E-40DD-AFC4-6F175D3DCCD1}">
-              <a14:hiddenFill xmlns:a14="http://schemas.microsoft.com/office/drawing/2010/main">
-                <a:solidFill>
-                  <a:schemeClr val="accent1"/>
-                </a:solidFill>
-              </a14:hiddenFill>
-            </a:ext>
-            <a:ext uri="{91240B29-F687-4F45-9708-019B960494DF}">
-              <a14:hiddenLine xmlns:a14="http://schemas.microsoft.com/office/drawing/2010/main" w="9525">
-                <a:solidFill>
-                  <a:schemeClr val="tx1"/>
-                </a:solidFill>
-                <a:miter lim="800000"/>
-                <a:headEnd/>
-                <a:tailEnd/>
-              </a14:hiddenLine>
-            </a:ext>
-          </a:extLst>
-        </p:spPr>
-      </p:pic>
+        </p:txBody>
+      </p:sp>
     </p:spTree>
     <p:extLst>
       <p:ext uri="{BB962C8B-B14F-4D97-AF65-F5344CB8AC3E}">
-        <p14:creationId xmlns:p14="http://schemas.microsoft.com/office/powerpoint/2010/main" val="1059963772"/>
+        <p14:creationId xmlns:p14="http://schemas.microsoft.com/office/powerpoint/2010/main" val="1801816137"/>
       </p:ext>
     </p:extLst>
   </p:cSld>
   <p:clrMapOvr>
     <a:masterClrMapping/>
   </p:clrMapOvr>
+  <p:timing>
+    <p:tnLst>
+      <p:par>
+        <p:cTn id="1" dur="indefinite" restart="never" nodeType="tmRoot"/>
+      </p:par>
+    </p:tnLst>
+  </p:timing>
 </p:sld>
 </file>
 
@@ -5175,7 +5305,7 @@
       </p:grpSpPr>
       <p:sp>
         <p:nvSpPr>
-          <p:cNvPr id="3" name="Content Placeholder 2"/>
+          <p:cNvPr id="2" name="Content Placeholder 1"/>
           <p:cNvSpPr>
             <a:spLocks noGrp="1"/>
           </p:cNvSpPr>
@@ -5185,108 +5315,56 @@
         </p:nvSpPr>
         <p:spPr/>
         <p:txBody>
-          <a:bodyPr>
-            <a:normAutofit/>
-          </a:bodyPr>
-          <a:lstStyle/>
-          <a:p>
-            <a:r>
-              <a:rPr lang="en-US" dirty="0" smtClean="0"/>
-              <a:t>Text editor (</a:t>
-            </a:r>
-            <a:r>
-              <a:rPr lang="en-US" dirty="0" err="1" smtClean="0"/>
-              <a:t>SublimeText</a:t>
-            </a:r>
-            <a:r>
-              <a:rPr lang="en-US" dirty="0" smtClean="0"/>
-              <a:t>)</a:t>
-            </a:r>
-          </a:p>
-          <a:p>
-            <a:r>
-              <a:rPr lang="en-US" dirty="0" smtClean="0"/>
-              <a:t>Web server (</a:t>
-            </a:r>
-            <a:r>
-              <a:rPr lang="en-US" dirty="0" err="1" smtClean="0"/>
-              <a:t>NodeJS</a:t>
-            </a:r>
-            <a:r>
-              <a:rPr lang="en-US" dirty="0" smtClean="0"/>
-              <a:t>)</a:t>
-            </a:r>
-          </a:p>
-          <a:p>
-            <a:r>
-              <a:rPr lang="en-US" dirty="0" smtClean="0"/>
-              <a:t>Test runner (</a:t>
-            </a:r>
-            <a:r>
-              <a:rPr lang="en-US" dirty="0" err="1" smtClean="0"/>
-              <a:t>Testacular</a:t>
-            </a:r>
-            <a:r>
-              <a:rPr lang="en-US" dirty="0" smtClean="0"/>
-              <a:t>)</a:t>
-            </a:r>
-          </a:p>
-          <a:p>
-            <a:r>
-              <a:rPr lang="en-US" dirty="0" smtClean="0"/>
-              <a:t>Console (</a:t>
-            </a:r>
-            <a:r>
-              <a:rPr lang="en-US" dirty="0" err="1" smtClean="0"/>
-              <a:t>Powershell</a:t>
-            </a:r>
-            <a:r>
-              <a:rPr lang="en-US" dirty="0" smtClean="0"/>
-              <a:t>)</a:t>
-            </a:r>
-          </a:p>
-          <a:p>
-            <a:r>
-              <a:rPr lang="en-US" dirty="0" smtClean="0"/>
-              <a:t>Web services</a:t>
-            </a:r>
-          </a:p>
-          <a:p>
-            <a:r>
-              <a:rPr lang="en-US" dirty="0" smtClean="0"/>
-              <a:t>Quick feedback loop + all driven by keyboard = happy </a:t>
-            </a:r>
-            <a:r>
-              <a:rPr lang="en-US" dirty="0" err="1" smtClean="0"/>
-              <a:t>dev</a:t>
-            </a:r>
-            <a:r>
-              <a:rPr lang="en-US" dirty="0" smtClean="0"/>
-              <a:t> = </a:t>
-            </a:r>
-            <a:r>
-              <a:rPr lang="en-US" dirty="0" err="1" smtClean="0"/>
-              <a:t>mo</a:t>
-            </a:r>
-            <a:r>
-              <a:rPr lang="en-US" dirty="0" smtClean="0"/>
-              <a:t> features = </a:t>
-            </a:r>
-            <a:r>
-              <a:rPr lang="en-US" dirty="0" err="1" smtClean="0"/>
-              <a:t>mo</a:t>
-            </a:r>
-            <a:r>
-              <a:rPr lang="en-US" dirty="0" smtClean="0"/>
-              <a:t> money $</a:t>
+          <a:bodyPr/>
+          <a:lstStyle/>
+          <a:p>
+            <a:r>
+              <a:rPr lang="en-US" dirty="0" smtClean="0"/>
+              <a:t>Declarative HTML (with semantic markup!)</a:t>
             </a:r>
             <a:endParaRPr lang="en-US" dirty="0"/>
           </a:p>
-        </p:txBody>
-      </p:sp>
-      <p:sp>
-        <p:nvSpPr>
-          <p:cNvPr id="2" name="Title 1"/>
+          <a:p>
+            <a:r>
+              <a:rPr lang="en-US" dirty="0"/>
+              <a:t>Templates don’t feature string </a:t>
+            </a:r>
+            <a:r>
+              <a:rPr lang="en-US" dirty="0" smtClean="0"/>
+              <a:t>manipulation</a:t>
+            </a:r>
+          </a:p>
+          <a:p>
+            <a:r>
+              <a:rPr lang="en-US" dirty="0"/>
+              <a:t>Re-usable components (directives</a:t>
+            </a:r>
+            <a:r>
+              <a:rPr lang="en-US" dirty="0" smtClean="0"/>
+              <a:t>):</a:t>
+            </a:r>
+            <a:endParaRPr lang="en-US" dirty="0"/>
+          </a:p>
+          <a:p>
+            <a:r>
+              <a:rPr lang="en-US" dirty="0" smtClean="0">
+                <a:hlinkClick r:id="rId2"/>
+              </a:rPr>
+              <a:t>http</a:t>
+            </a:r>
+            <a:r>
+              <a:rPr lang="en-US" dirty="0">
+                <a:hlinkClick r:id="rId2"/>
+              </a:rPr>
+              <a:t>://jsfiddle.net/codef0rmer/Vq6KD/</a:t>
+            </a:r>
+            <a:endParaRPr lang="en-US" dirty="0"/>
+          </a:p>
+        </p:txBody>
+      </p:sp>
+      <p:sp>
+        <p:nvSpPr>
+          <p:cNvPr id="3" name="Title 2"/>
           <p:cNvSpPr>
             <a:spLocks noGrp="1"/>
           </p:cNvSpPr>
@@ -5299,18 +5377,6 @@
           <a:bodyPr/>
           <a:lstStyle/>
           <a:p>
-            <a:r>
-              <a:rPr lang="en-US" dirty="0" smtClean="0"/>
-              <a:t>Full </a:t>
-            </a:r>
-            <a:r>
-              <a:rPr lang="en-US" dirty="0" err="1" smtClean="0"/>
-              <a:t>toolstack</a:t>
-            </a:r>
-            <a:r>
-              <a:rPr lang="en-US" dirty="0" smtClean="0"/>
-              <a:t>?</a:t>
-            </a:r>
             <a:endParaRPr lang="en-US" dirty="0"/>
           </a:p>
         </p:txBody>
@@ -5318,13 +5384,20 @@
     </p:spTree>
     <p:extLst>
       <p:ext uri="{BB962C8B-B14F-4D97-AF65-F5344CB8AC3E}">
-        <p14:creationId xmlns:p14="http://schemas.microsoft.com/office/powerpoint/2010/main" val="91439856"/>
+        <p14:creationId xmlns:p14="http://schemas.microsoft.com/office/powerpoint/2010/main" val="1059963772"/>
       </p:ext>
     </p:extLst>
   </p:cSld>
   <p:clrMapOvr>
     <a:masterClrMapping/>
   </p:clrMapOvr>
+  <p:timing>
+    <p:tnLst>
+      <p:par>
+        <p:cTn id="1" dur="indefinite" restart="never" nodeType="tmRoot"/>
+      </p:par>
+    </p:tnLst>
+  </p:timing>
 </p:sld>
 </file>
 
@@ -5357,32 +5430,103 @@
         </p:nvSpPr>
         <p:spPr/>
         <p:txBody>
-          <a:bodyPr/>
-          <a:lstStyle/>
-          <a:p>
-            <a:endParaRPr lang="en-US" dirty="0" smtClean="0"/>
-          </a:p>
-          <a:p>
+          <a:bodyPr>
+            <a:normAutofit/>
+          </a:bodyPr>
+          <a:lstStyle/>
+          <a:p>
+            <a:r>
+              <a:rPr lang="en-US" dirty="0" smtClean="0"/>
+              <a:t>Text editor (</a:t>
+            </a:r>
+            <a:r>
+              <a:rPr lang="en-US" dirty="0" err="1" smtClean="0"/>
+              <a:t>SublimeText</a:t>
+            </a:r>
+            <a:r>
+              <a:rPr lang="en-US" dirty="0" smtClean="0"/>
+              <a:t>)</a:t>
+            </a:r>
+          </a:p>
+          <a:p>
+            <a:r>
+              <a:rPr lang="en-US" dirty="0" smtClean="0"/>
+              <a:t>Web server (</a:t>
+            </a:r>
+            <a:r>
+              <a:rPr lang="en-US" dirty="0" err="1" smtClean="0"/>
+              <a:t>NodeJS</a:t>
+            </a:r>
+            <a:r>
+              <a:rPr lang="en-US" dirty="0" smtClean="0"/>
+              <a:t>)</a:t>
+            </a:r>
+          </a:p>
+          <a:p>
+            <a:r>
+              <a:rPr lang="en-US" dirty="0" smtClean="0"/>
+              <a:t>Test runner (</a:t>
+            </a:r>
+            <a:r>
+              <a:rPr lang="en-US" dirty="0" err="1" smtClean="0"/>
+              <a:t>Testacular</a:t>
+            </a:r>
+            <a:r>
+              <a:rPr lang="en-US" dirty="0" smtClean="0"/>
+              <a:t> aka Karma)</a:t>
+            </a:r>
+          </a:p>
+          <a:p>
+            <a:r>
+              <a:rPr lang="en-US" dirty="0" smtClean="0"/>
+              <a:t>Console (</a:t>
+            </a:r>
+            <a:r>
+              <a:rPr lang="en-US" dirty="0" err="1" smtClean="0"/>
+              <a:t>Powershell</a:t>
+            </a:r>
+            <a:r>
+              <a:rPr lang="en-US" dirty="0" smtClean="0"/>
+              <a:t>)</a:t>
+            </a:r>
+          </a:p>
+          <a:p>
+            <a:r>
+              <a:rPr lang="en-US" dirty="0" smtClean="0"/>
+              <a:t>Web services</a:t>
+            </a:r>
+          </a:p>
+          <a:p>
+            <a:r>
+              <a:rPr lang="en-US" dirty="0" smtClean="0"/>
+              <a:t>Quick feedback loop + all driven by keyboard = happy </a:t>
+            </a:r>
+            <a:r>
+              <a:rPr lang="en-US" dirty="0" err="1" smtClean="0"/>
+              <a:t>dev</a:t>
+            </a:r>
+            <a:r>
+              <a:rPr lang="en-US" dirty="0" smtClean="0"/>
+              <a:t> = </a:t>
+            </a:r>
+            <a:r>
+              <a:rPr lang="en-US" dirty="0" err="1" smtClean="0"/>
+              <a:t>mo</a:t>
+            </a:r>
+            <a:r>
+              <a:rPr lang="en-US" dirty="0" smtClean="0"/>
+              <a:t> features = </a:t>
+            </a:r>
+            <a:r>
+              <a:rPr lang="en-US" dirty="0" err="1" smtClean="0"/>
+              <a:t>mo</a:t>
+            </a:r>
+            <a:r>
+              <a:rPr lang="en-US" dirty="0" smtClean="0"/>
+              <a:t> money $</a:t>
+            </a:r>
             <a:endParaRPr lang="en-US" dirty="0"/>
           </a:p>
-          <a:p>
-            <a:endParaRPr lang="en-US" dirty="0" smtClean="0"/>
-          </a:p>
-          <a:p>
-            <a:endParaRPr lang="en-US" dirty="0"/>
-          </a:p>
-          <a:p>
-            <a:endParaRPr lang="en-US" dirty="0" smtClean="0"/>
-          </a:p>
-          <a:p>
-            <a:endParaRPr lang="en-US" dirty="0"/>
-          </a:p>
-          <a:p>
-            <a:r>
-              <a:rPr lang="en-US" dirty="0" smtClean="0"/>
-              <a:t>I told you, it’s super heroic.</a:t>
-            </a:r>
-          </a:p>
         </p:txBody>
       </p:sp>
       <p:sp>
@@ -5402,11 +5546,11 @@
           <a:p>
             <a:r>
               <a:rPr lang="en-US" dirty="0" smtClean="0"/>
-              <a:t>What sucks about </a:t>
+              <a:t>Full </a:t>
             </a:r>
             <a:r>
               <a:rPr lang="en-US" dirty="0" err="1" smtClean="0"/>
-              <a:t>AngularJS</a:t>
+              <a:t>toolstack</a:t>
             </a:r>
             <a:r>
               <a:rPr lang="en-US" dirty="0" smtClean="0"/>
@@ -5419,13 +5563,20 @@
     </p:spTree>
     <p:extLst>
       <p:ext uri="{BB962C8B-B14F-4D97-AF65-F5344CB8AC3E}">
-        <p14:creationId xmlns:p14="http://schemas.microsoft.com/office/powerpoint/2010/main" val="3567775276"/>
+        <p14:creationId xmlns:p14="http://schemas.microsoft.com/office/powerpoint/2010/main" val="91439856"/>
       </p:ext>
     </p:extLst>
   </p:cSld>
   <p:clrMapOvr>
     <a:masterClrMapping/>
   </p:clrMapOvr>
+  <p:timing>
+    <p:tnLst>
+      <p:par>
+        <p:cTn id="1" dur="indefinite" restart="never" nodeType="tmRoot"/>
+      </p:par>
+    </p:tnLst>
+  </p:timing>
 </p:sld>
 </file>
 

</xml_diff>